<commit_message>
created presentation and finished dashboard
</commit_message>
<xml_diff>
--- a/Penguins Presentation.pptx
+++ b/Penguins Presentation.pptx
@@ -6239,7 +6239,7 @@
         </p:spPr>
         <p:txBody>
           <a:bodyPr>
-            <a:normAutofit lnSpcReduction="10000"/>
+            <a:normAutofit fontScale="92500" lnSpcReduction="10000"/>
           </a:bodyPr>
           <a:lstStyle/>
           <a:p>
@@ -6298,7 +6298,7 @@
             </a:pPr>
             <a:r>
               <a:rPr lang="en-US" sz="1800" dirty="0"/>
-              <a:t>Database storing attendance data for 32 NHL teams and all 1312 regular season games</a:t>
+              <a:t>Database instance storing attendance data for 32 NHL teams and all 1312 regular season games</a:t>
             </a:r>
           </a:p>
           <a:p>

</xml_diff>

<commit_message>
finished ppt and dashboard
</commit_message>
<xml_diff>
--- a/Penguins Presentation.pptx
+++ b/Penguins Presentation.pptx
@@ -10,6 +10,9 @@
     <p:sldId id="260" r:id="rId4"/>
     <p:sldId id="261" r:id="rId5"/>
     <p:sldId id="258" r:id="rId6"/>
+    <p:sldId id="263" r:id="rId7"/>
+    <p:sldId id="264" r:id="rId8"/>
+    <p:sldId id="265" r:id="rId9"/>
   </p:sldIdLst>
   <p:sldSz cx="12192000" cy="6858000"/>
   <p:notesSz cx="6858000" cy="9144000"/>
@@ -5964,7 +5967,7 @@
           <a:p>
             <a:r>
               <a:rPr lang="en-US" sz="3600" dirty="0"/>
-              <a:t>To Showcase data analysis and visualization skillsets using NHL attendance data</a:t>
+              <a:t>To showcase data analysis and visualization skills using NHL attendance data</a:t>
             </a:r>
           </a:p>
           <a:p>
@@ -6979,9 +6982,25 @@
           <a:lstStyle/>
           <a:p>
             <a:r>
-              <a:rPr lang="en-US" sz="4400"/>
+              <a:rPr lang="en-US" sz="4400" dirty="0">
+                <a:solidFill>
+                  <a:schemeClr val="bg1"/>
+                </a:solidFill>
+                <a:hlinkClick r:id="rId3">
+                  <a:extLst>
+                    <a:ext uri="{A12FA001-AC4F-418D-AE19-62706E023703}">
+                      <ahyp:hlinkClr xmlns:ahyp="http://schemas.microsoft.com/office/drawing/2018/hyperlinkcolor" val="tx"/>
+                    </a:ext>
+                  </a:extLst>
+                </a:hlinkClick>
+              </a:rPr>
               <a:t>Demo</a:t>
             </a:r>
+            <a:endParaRPr lang="en-US" sz="4400" dirty="0">
+              <a:solidFill>
+                <a:schemeClr val="bg1"/>
+              </a:solidFill>
+            </a:endParaRPr>
           </a:p>
         </p:txBody>
       </p:sp>
@@ -7000,7 +7019,7 @@
           <p:nvPr/>
         </p:nvPicPr>
         <p:blipFill>
-          <a:blip r:embed="rId3">
+          <a:blip r:embed="rId4">
             <a:extLst>
               <a:ext uri="{28A0092B-C50C-407E-A947-70E740481C1C}">
                 <a14:useLocalDpi xmlns:a14="http://schemas.microsoft.com/office/drawing/2010/main" val="0"/>
@@ -7048,6 +7067,928 @@
   </p:cSld>
   <p:clrMapOvr>
     <a:overrideClrMapping bg1="lt1" tx1="dk1" bg2="lt2" tx2="dk2" accent1="accent1" accent2="accent2" accent3="accent3" accent4="accent4" accent5="accent5" accent6="accent6" hlink="hlink" folHlink="folHlink"/>
+  </p:clrMapOvr>
+</p:sld>
+</file>
+
+<file path=ppt/slides/slide6.xml><?xml version="1.0" encoding="utf-8"?>
+<p:sld xmlns:a="http://schemas.openxmlformats.org/drawingml/2006/main" xmlns:r="http://schemas.openxmlformats.org/officeDocument/2006/relationships" xmlns:p="http://schemas.openxmlformats.org/presentationml/2006/main">
+  <p:cSld>
+    <p:bg>
+      <p:bgPr>
+        <a:solidFill>
+          <a:schemeClr val="bg2"/>
+        </a:solidFill>
+        <a:effectLst/>
+      </p:bgPr>
+    </p:bg>
+    <p:spTree>
+      <p:nvGrpSpPr>
+        <p:cNvPr id="1" name=""/>
+        <p:cNvGrpSpPr/>
+        <p:nvPr/>
+      </p:nvGrpSpPr>
+      <p:grpSpPr>
+        <a:xfrm>
+          <a:off x="0" y="0"/>
+          <a:ext cx="0" cy="0"/>
+          <a:chOff x="0" y="0"/>
+          <a:chExt cx="0" cy="0"/>
+        </a:xfrm>
+      </p:grpSpPr>
+      <p:sp>
+        <p:nvSpPr>
+          <p:cNvPr id="28" name="Freeform 6">
+            <a:extLst>
+              <a:ext uri="{FF2B5EF4-FFF2-40B4-BE49-F238E27FC236}">
+                <a16:creationId xmlns:a16="http://schemas.microsoft.com/office/drawing/2014/main" id="{53576798-7F98-4C7F-B6C7-6D41B5A7E927}"/>
+              </a:ext>
+              <a:ext uri="{C183D7F6-B498-43B3-948B-1728B52AA6E4}">
+                <adec:decorative xmlns:adec="http://schemas.microsoft.com/office/drawing/2017/decorative" val="1"/>
+              </a:ext>
+            </a:extLst>
+          </p:cNvPr>
+          <p:cNvSpPr>
+            <a:spLocks noGrp="1" noRot="1" noChangeAspect="1" noMove="1" noResize="1" noEditPoints="1" noAdjustHandles="1" noChangeArrowheads="1" noChangeShapeType="1" noTextEdit="1"/>
+          </p:cNvSpPr>
+          <p:nvPr>
+            <p:extLst>
+              <p:ext uri="{386F3935-93C4-4BCD-93E2-E3B085C9AB24}">
+                <p16:designElem xmlns:p16="http://schemas.microsoft.com/office/powerpoint/2015/main" val="1"/>
+              </p:ext>
+            </p:extLst>
+          </p:nvPr>
+        </p:nvSpPr>
+        <p:spPr bwMode="auto">
+          <a:xfrm>
+            <a:off x="0" y="0"/>
+            <a:ext cx="12192000" cy="2185988"/>
+          </a:xfrm>
+          <a:custGeom>
+            <a:avLst/>
+            <a:gdLst/>
+            <a:ahLst/>
+            <a:cxnLst/>
+            <a:rect l="0" t="0" r="r" b="b"/>
+            <a:pathLst>
+              <a:path w="5760" h="1377">
+                <a:moveTo>
+                  <a:pt x="5760" y="0"/>
+                </a:moveTo>
+                <a:lnTo>
+                  <a:pt x="0" y="0"/>
+                </a:lnTo>
+                <a:lnTo>
+                  <a:pt x="0" y="1189"/>
+                </a:lnTo>
+                <a:lnTo>
+                  <a:pt x="943" y="1189"/>
+                </a:lnTo>
+                <a:lnTo>
+                  <a:pt x="1123" y="1369"/>
+                </a:lnTo>
+                <a:lnTo>
+                  <a:pt x="1123" y="1369"/>
+                </a:lnTo>
+                <a:lnTo>
+                  <a:pt x="1127" y="1371"/>
+                </a:lnTo>
+                <a:lnTo>
+                  <a:pt x="1133" y="1374"/>
+                </a:lnTo>
+                <a:lnTo>
+                  <a:pt x="1139" y="1377"/>
+                </a:lnTo>
+                <a:lnTo>
+                  <a:pt x="1144" y="1377"/>
+                </a:lnTo>
+                <a:lnTo>
+                  <a:pt x="1150" y="1377"/>
+                </a:lnTo>
+                <a:lnTo>
+                  <a:pt x="1155" y="1374"/>
+                </a:lnTo>
+                <a:lnTo>
+                  <a:pt x="1161" y="1371"/>
+                </a:lnTo>
+                <a:lnTo>
+                  <a:pt x="1165" y="1369"/>
+                </a:lnTo>
+                <a:lnTo>
+                  <a:pt x="1345" y="1189"/>
+                </a:lnTo>
+                <a:lnTo>
+                  <a:pt x="5760" y="1189"/>
+                </a:lnTo>
+                <a:lnTo>
+                  <a:pt x="5760" y="0"/>
+                </a:lnTo>
+                <a:close/>
+              </a:path>
+            </a:pathLst>
+          </a:custGeom>
+          <a:ln/>
+          <a:extLst>
+            <a:ext uri="{91240B29-F687-4f45-9708-019B960494DF}">
+              <a14:hiddenLine xmlns="" xmlns:a16="http://schemas.microsoft.com/office/drawing/2014/main" xmlns:p14="http://schemas.microsoft.com/office/powerpoint/2010/main" xmlns:a14="http://schemas.microsoft.com/office/drawing/2010/main" w="9525">
+                <a:solidFill>
+                  <a:srgbClr val="000000"/>
+                </a:solidFill>
+                <a:round/>
+                <a:headEnd/>
+                <a:tailEnd/>
+              </a14:hiddenLine>
+            </a:ext>
+          </a:extLst>
+        </p:spPr>
+        <p:style>
+          <a:lnRef idx="1">
+            <a:schemeClr val="accent1"/>
+          </a:lnRef>
+          <a:fillRef idx="3">
+            <a:schemeClr val="accent1"/>
+          </a:fillRef>
+          <a:effectRef idx="2">
+            <a:schemeClr val="accent1"/>
+          </a:effectRef>
+          <a:fontRef idx="minor">
+            <a:schemeClr val="lt1"/>
+          </a:fontRef>
+        </p:style>
+      </p:sp>
+      <p:sp>
+        <p:nvSpPr>
+          <p:cNvPr id="2" name="Title 1">
+            <a:extLst>
+              <a:ext uri="{FF2B5EF4-FFF2-40B4-BE49-F238E27FC236}">
+                <a16:creationId xmlns:a16="http://schemas.microsoft.com/office/drawing/2014/main" id="{354357A0-C9E4-26F9-48AF-BBDD2B2AF38C}"/>
+              </a:ext>
+            </a:extLst>
+          </p:cNvPr>
+          <p:cNvSpPr>
+            <a:spLocks noGrp="1"/>
+          </p:cNvSpPr>
+          <p:nvPr>
+            <p:ph type="title"/>
+          </p:nvPr>
+        </p:nvSpPr>
+        <p:spPr>
+          <a:xfrm>
+            <a:off x="810000" y="447188"/>
+            <a:ext cx="10571998" cy="970450"/>
+          </a:xfrm>
+        </p:spPr>
+        <p:txBody>
+          <a:bodyPr vert="horz" lIns="91440" tIns="45720" rIns="91440" bIns="45720" rtlCol="0" anchor="b">
+            <a:normAutofit/>
+          </a:bodyPr>
+          <a:lstStyle/>
+          <a:p>
+            <a:r>
+              <a:rPr lang="en-US"/>
+              <a:t>Conclusions</a:t>
+            </a:r>
+          </a:p>
+        </p:txBody>
+      </p:sp>
+      <p:sp>
+        <p:nvSpPr>
+          <p:cNvPr id="4" name="Content Placeholder 3">
+            <a:extLst>
+              <a:ext uri="{FF2B5EF4-FFF2-40B4-BE49-F238E27FC236}">
+                <a16:creationId xmlns:a16="http://schemas.microsoft.com/office/drawing/2014/main" id="{64CB3AC0-08FE-2658-02FF-7966E8C0E9A5}"/>
+              </a:ext>
+            </a:extLst>
+          </p:cNvPr>
+          <p:cNvSpPr>
+            <a:spLocks noGrp="1"/>
+          </p:cNvSpPr>
+          <p:nvPr>
+            <p:ph sz="half" idx="2"/>
+          </p:nvPr>
+        </p:nvSpPr>
+        <p:spPr>
+          <a:xfrm>
+            <a:off x="818713" y="2413000"/>
+            <a:ext cx="3835583" cy="3632200"/>
+          </a:xfrm>
+        </p:spPr>
+        <p:txBody>
+          <a:bodyPr vert="horz" lIns="91440" tIns="45720" rIns="91440" bIns="45720" rtlCol="0" anchor="ctr">
+            <a:normAutofit/>
+          </a:bodyPr>
+          <a:lstStyle/>
+          <a:p>
+            <a:r>
+              <a:rPr lang="en-US" sz="1600" dirty="0"/>
+              <a:t>Attendance is highest on Friday nights and weekend afternoons</a:t>
+            </a:r>
+          </a:p>
+          <a:p>
+            <a:r>
+              <a:rPr lang="en-US" sz="1600" dirty="0"/>
+              <a:t>Attendance generally increases and varies less later in the season</a:t>
+            </a:r>
+          </a:p>
+          <a:p>
+            <a:r>
+              <a:rPr lang="en-US" sz="1600" dirty="0"/>
+              <a:t>Visiting teams:</a:t>
+            </a:r>
+          </a:p>
+          <a:p>
+            <a:pPr lvl="1"/>
+            <a:r>
+              <a:rPr lang="en-US" sz="1400" dirty="0"/>
+              <a:t>Chicago draws the most fans</a:t>
+            </a:r>
+          </a:p>
+          <a:p>
+            <a:pPr lvl="1"/>
+            <a:r>
+              <a:rPr lang="en-US" sz="1400" dirty="0"/>
+              <a:t>Toronto draws the least fans</a:t>
+            </a:r>
+          </a:p>
+          <a:p>
+            <a:endParaRPr lang="en-US" sz="1600" dirty="0"/>
+          </a:p>
+          <a:p>
+            <a:endParaRPr lang="en-US" sz="1600" dirty="0"/>
+          </a:p>
+          <a:p>
+            <a:endParaRPr lang="en-US" sz="1600" dirty="0"/>
+          </a:p>
+        </p:txBody>
+      </p:sp>
+      <p:pic>
+        <p:nvPicPr>
+          <p:cNvPr id="8" name="Picture 7" descr="Graphical user interface&#10;&#10;Description automatically generated with medium confidence">
+            <a:extLst>
+              <a:ext uri="{FF2B5EF4-FFF2-40B4-BE49-F238E27FC236}">
+                <a16:creationId xmlns:a16="http://schemas.microsoft.com/office/drawing/2014/main" id="{6D730384-1F21-8D70-AF91-3536F8BC8D7F}"/>
+              </a:ext>
+            </a:extLst>
+          </p:cNvPr>
+          <p:cNvPicPr>
+            <a:picLocks noChangeAspect="1"/>
+          </p:cNvPicPr>
+          <p:nvPr/>
+        </p:nvPicPr>
+        <p:blipFill>
+          <a:blip r:embed="rId2"/>
+          <a:stretch>
+            <a:fillRect/>
+          </a:stretch>
+        </p:blipFill>
+        <p:spPr>
+          <a:xfrm>
+            <a:off x="4602923" y="2843072"/>
+            <a:ext cx="7536574" cy="3429140"/>
+          </a:xfrm>
+          <a:prstGeom prst="roundRect">
+            <a:avLst>
+              <a:gd name="adj" fmla="val 3876"/>
+            </a:avLst>
+          </a:prstGeom>
+          <a:ln>
+            <a:solidFill>
+              <a:schemeClr val="accent1"/>
+            </a:solidFill>
+          </a:ln>
+          <a:effectLst/>
+        </p:spPr>
+      </p:pic>
+    </p:spTree>
+    <p:extLst>
+      <p:ext uri="{BB962C8B-B14F-4D97-AF65-F5344CB8AC3E}">
+        <p14:creationId xmlns:p14="http://schemas.microsoft.com/office/powerpoint/2010/main" val="203060742"/>
+      </p:ext>
+    </p:extLst>
+  </p:cSld>
+  <p:clrMapOvr>
+    <a:masterClrMapping/>
+  </p:clrMapOvr>
+</p:sld>
+</file>
+
+<file path=ppt/slides/slide7.xml><?xml version="1.0" encoding="utf-8"?>
+<p:sld xmlns:a="http://schemas.openxmlformats.org/drawingml/2006/main" xmlns:r="http://schemas.openxmlformats.org/officeDocument/2006/relationships" xmlns:p="http://schemas.openxmlformats.org/presentationml/2006/main">
+  <p:cSld>
+    <p:spTree>
+      <p:nvGrpSpPr>
+        <p:cNvPr id="1" name=""/>
+        <p:cNvGrpSpPr/>
+        <p:nvPr/>
+      </p:nvGrpSpPr>
+      <p:grpSpPr>
+        <a:xfrm>
+          <a:off x="0" y="0"/>
+          <a:ext cx="0" cy="0"/>
+          <a:chOff x="0" y="0"/>
+          <a:chExt cx="0" cy="0"/>
+        </a:xfrm>
+      </p:grpSpPr>
+      <p:sp>
+        <p:nvSpPr>
+          <p:cNvPr id="2" name="Title 1">
+            <a:extLst>
+              <a:ext uri="{FF2B5EF4-FFF2-40B4-BE49-F238E27FC236}">
+                <a16:creationId xmlns:a16="http://schemas.microsoft.com/office/drawing/2014/main" id="{AB5DBA23-0D1D-4B71-F9A5-0E3346512AC7}"/>
+              </a:ext>
+            </a:extLst>
+          </p:cNvPr>
+          <p:cNvSpPr>
+            <a:spLocks noGrp="1"/>
+          </p:cNvSpPr>
+          <p:nvPr>
+            <p:ph type="title"/>
+          </p:nvPr>
+        </p:nvSpPr>
+        <p:spPr/>
+        <p:txBody>
+          <a:bodyPr/>
+          <a:lstStyle/>
+          <a:p>
+            <a:r>
+              <a:rPr lang="en-US" dirty="0"/>
+              <a:t>Future Directions</a:t>
+            </a:r>
+          </a:p>
+        </p:txBody>
+      </p:sp>
+      <p:sp>
+        <p:nvSpPr>
+          <p:cNvPr id="3" name="Content Placeholder 2">
+            <a:extLst>
+              <a:ext uri="{FF2B5EF4-FFF2-40B4-BE49-F238E27FC236}">
+                <a16:creationId xmlns:a16="http://schemas.microsoft.com/office/drawing/2014/main" id="{904056D6-1B66-0AE4-E177-61C2EF5A5D27}"/>
+              </a:ext>
+            </a:extLst>
+          </p:cNvPr>
+          <p:cNvSpPr>
+            <a:spLocks noGrp="1"/>
+          </p:cNvSpPr>
+          <p:nvPr>
+            <p:ph idx="1"/>
+          </p:nvPr>
+        </p:nvSpPr>
+        <p:spPr/>
+        <p:txBody>
+          <a:bodyPr/>
+          <a:lstStyle/>
+          <a:p>
+            <a:r>
+              <a:rPr lang="en-US" dirty="0"/>
+              <a:t>Live updating from an API</a:t>
+            </a:r>
+          </a:p>
+          <a:p>
+            <a:r>
+              <a:rPr lang="en-US" dirty="0"/>
+              <a:t>Integrate ticket data</a:t>
+            </a:r>
+          </a:p>
+          <a:p>
+            <a:pPr lvl="1"/>
+            <a:r>
+              <a:rPr lang="en-US" dirty="0"/>
+              <a:t>How do ticket prices affect attendance and revenue?</a:t>
+            </a:r>
+          </a:p>
+          <a:p>
+            <a:r>
+              <a:rPr lang="en-US" dirty="0"/>
+              <a:t>Analyze promotional nights</a:t>
+            </a:r>
+          </a:p>
+          <a:p>
+            <a:r>
+              <a:rPr lang="en-US" dirty="0"/>
+              <a:t>Road trip attendance analysis</a:t>
+            </a:r>
+          </a:p>
+          <a:p>
+            <a:r>
+              <a:rPr lang="en-US" dirty="0"/>
+              <a:t>Build regression model to predict future attendance and revenue</a:t>
+            </a:r>
+          </a:p>
+        </p:txBody>
+      </p:sp>
+    </p:spTree>
+    <p:extLst>
+      <p:ext uri="{BB962C8B-B14F-4D97-AF65-F5344CB8AC3E}">
+        <p14:creationId xmlns:p14="http://schemas.microsoft.com/office/powerpoint/2010/main" val="1306189201"/>
+      </p:ext>
+    </p:extLst>
+  </p:cSld>
+  <p:clrMapOvr>
+    <a:masterClrMapping/>
+  </p:clrMapOvr>
+</p:sld>
+</file>
+
+<file path=ppt/slides/slide8.xml><?xml version="1.0" encoding="utf-8"?>
+<p:sld xmlns:a="http://schemas.openxmlformats.org/drawingml/2006/main" xmlns:r="http://schemas.openxmlformats.org/officeDocument/2006/relationships" xmlns:p="http://schemas.openxmlformats.org/presentationml/2006/main">
+  <p:cSld>
+    <p:bg>
+      <p:bgPr>
+        <a:solidFill>
+          <a:schemeClr val="bg2"/>
+        </a:solidFill>
+        <a:effectLst/>
+      </p:bgPr>
+    </p:bg>
+    <p:spTree>
+      <p:nvGrpSpPr>
+        <p:cNvPr id="1" name=""/>
+        <p:cNvGrpSpPr/>
+        <p:nvPr/>
+      </p:nvGrpSpPr>
+      <p:grpSpPr>
+        <a:xfrm>
+          <a:off x="0" y="0"/>
+          <a:ext cx="0" cy="0"/>
+          <a:chOff x="0" y="0"/>
+          <a:chExt cx="0" cy="0"/>
+        </a:xfrm>
+      </p:grpSpPr>
+      <p:sp>
+        <p:nvSpPr>
+          <p:cNvPr id="7" name="Freeform 6">
+            <a:extLst>
+              <a:ext uri="{FF2B5EF4-FFF2-40B4-BE49-F238E27FC236}">
+                <a16:creationId xmlns:a16="http://schemas.microsoft.com/office/drawing/2014/main" id="{8775F366-526C-4C42-8931-696FFE8AA517}"/>
+              </a:ext>
+              <a:ext uri="{C183D7F6-B498-43B3-948B-1728B52AA6E4}">
+                <adec:decorative xmlns:adec="http://schemas.microsoft.com/office/drawing/2017/decorative" val="1"/>
+              </a:ext>
+            </a:extLst>
+          </p:cNvPr>
+          <p:cNvSpPr>
+            <a:spLocks noGrp="1" noRot="1" noChangeAspect="1" noMove="1" noResize="1" noEditPoints="1" noAdjustHandles="1" noChangeArrowheads="1" noChangeShapeType="1" noTextEdit="1"/>
+          </p:cNvSpPr>
+          <p:nvPr>
+            <p:extLst>
+              <p:ext uri="{386F3935-93C4-4BCD-93E2-E3B085C9AB24}">
+                <p16:designElem xmlns:p16="http://schemas.microsoft.com/office/powerpoint/2015/main" val="1"/>
+              </p:ext>
+            </p:extLst>
+          </p:nvPr>
+        </p:nvSpPr>
+        <p:spPr bwMode="auto">
+          <a:xfrm>
+            <a:off x="0" y="-3175"/>
+            <a:ext cx="12192000" cy="5203825"/>
+          </a:xfrm>
+          <a:custGeom>
+            <a:avLst/>
+            <a:gdLst/>
+            <a:ahLst/>
+            <a:cxnLst/>
+            <a:rect l="0" t="0" r="r" b="b"/>
+            <a:pathLst>
+              <a:path w="5760" h="3278">
+                <a:moveTo>
+                  <a:pt x="5760" y="0"/>
+                </a:moveTo>
+                <a:lnTo>
+                  <a:pt x="0" y="0"/>
+                </a:lnTo>
+                <a:lnTo>
+                  <a:pt x="0" y="3090"/>
+                </a:lnTo>
+                <a:lnTo>
+                  <a:pt x="943" y="3090"/>
+                </a:lnTo>
+                <a:lnTo>
+                  <a:pt x="1123" y="3270"/>
+                </a:lnTo>
+                <a:lnTo>
+                  <a:pt x="1123" y="3270"/>
+                </a:lnTo>
+                <a:lnTo>
+                  <a:pt x="1127" y="3272"/>
+                </a:lnTo>
+                <a:lnTo>
+                  <a:pt x="1133" y="3275"/>
+                </a:lnTo>
+                <a:lnTo>
+                  <a:pt x="1139" y="3278"/>
+                </a:lnTo>
+                <a:lnTo>
+                  <a:pt x="1144" y="3278"/>
+                </a:lnTo>
+                <a:lnTo>
+                  <a:pt x="1150" y="3278"/>
+                </a:lnTo>
+                <a:lnTo>
+                  <a:pt x="1155" y="3275"/>
+                </a:lnTo>
+                <a:lnTo>
+                  <a:pt x="1161" y="3272"/>
+                </a:lnTo>
+                <a:lnTo>
+                  <a:pt x="1165" y="3270"/>
+                </a:lnTo>
+                <a:lnTo>
+                  <a:pt x="1345" y="3090"/>
+                </a:lnTo>
+                <a:lnTo>
+                  <a:pt x="5760" y="3090"/>
+                </a:lnTo>
+                <a:lnTo>
+                  <a:pt x="5760" y="0"/>
+                </a:lnTo>
+                <a:close/>
+              </a:path>
+            </a:pathLst>
+          </a:custGeom>
+          <a:ln/>
+          <a:effectLst/>
+          <a:extLst>
+            <a:ext uri="{91240B29-F687-4f45-9708-019B960494DF}">
+              <a14:hiddenLine xmlns="" xmlns:a14="http://schemas.microsoft.com/office/drawing/2010/main" xmlns:a16="http://schemas.microsoft.com/office/drawing/2014/main" w="9525">
+                <a:solidFill>
+                  <a:srgbClr val="000000"/>
+                </a:solidFill>
+                <a:round/>
+                <a:headEnd/>
+                <a:tailEnd/>
+              </a14:hiddenLine>
+            </a:ext>
+          </a:extLst>
+        </p:spPr>
+        <p:style>
+          <a:lnRef idx="1">
+            <a:schemeClr val="accent1"/>
+          </a:lnRef>
+          <a:fillRef idx="3">
+            <a:schemeClr val="accent1"/>
+          </a:fillRef>
+          <a:effectRef idx="2">
+            <a:schemeClr val="accent1"/>
+          </a:effectRef>
+          <a:fontRef idx="minor">
+            <a:schemeClr val="lt1"/>
+          </a:fontRef>
+        </p:style>
+      </p:sp>
+      <p:sp>
+        <p:nvSpPr>
+          <p:cNvPr id="9" name="Rectangle 8">
+            <a:extLst>
+              <a:ext uri="{FF2B5EF4-FFF2-40B4-BE49-F238E27FC236}">
+                <a16:creationId xmlns:a16="http://schemas.microsoft.com/office/drawing/2014/main" id="{12839A1C-34CB-4C3C-8531-CA67525FDE9E}"/>
+              </a:ext>
+              <a:ext uri="{C183D7F6-B498-43B3-948B-1728B52AA6E4}">
+                <adec:decorative xmlns:adec="http://schemas.microsoft.com/office/drawing/2017/decorative" val="1"/>
+              </a:ext>
+            </a:extLst>
+          </p:cNvPr>
+          <p:cNvSpPr>
+            <a:spLocks noGrp="1" noRot="1" noChangeAspect="1" noMove="1" noResize="1" noEditPoints="1" noAdjustHandles="1" noChangeArrowheads="1" noChangeShapeType="1" noTextEdit="1"/>
+          </p:cNvSpPr>
+          <p:nvPr>
+            <p:extLst>
+              <p:ext uri="{386F3935-93C4-4BCD-93E2-E3B085C9AB24}">
+                <p16:designElem xmlns:p16="http://schemas.microsoft.com/office/powerpoint/2015/main" val="1"/>
+              </p:ext>
+            </p:extLst>
+          </p:nvPr>
+        </p:nvSpPr>
+        <p:spPr>
+          <a:xfrm>
+            <a:off x="0" y="0"/>
+            <a:ext cx="12192000" cy="6858000"/>
+          </a:xfrm>
+          <a:prstGeom prst="rect">
+            <a:avLst/>
+          </a:prstGeom>
+          <a:solidFill>
+            <a:schemeClr val="accent1"/>
+          </a:solidFill>
+          <a:ln>
+            <a:noFill/>
+          </a:ln>
+        </p:spPr>
+        <p:style>
+          <a:lnRef idx="2">
+            <a:schemeClr val="accent1">
+              <a:shade val="50000"/>
+            </a:schemeClr>
+          </a:lnRef>
+          <a:fillRef idx="1">
+            <a:schemeClr val="accent1"/>
+          </a:fillRef>
+          <a:effectRef idx="0">
+            <a:schemeClr val="accent1"/>
+          </a:effectRef>
+          <a:fontRef idx="minor">
+            <a:schemeClr val="lt1"/>
+          </a:fontRef>
+        </p:style>
+        <p:txBody>
+          <a:bodyPr rtlCol="0" anchor="ctr"/>
+          <a:lstStyle/>
+          <a:p>
+            <a:pPr algn="ctr"/>
+            <a:endParaRPr lang="en-US"/>
+          </a:p>
+        </p:txBody>
+      </p:sp>
+      <p:sp>
+        <p:nvSpPr>
+          <p:cNvPr id="2" name="Title 1">
+            <a:extLst>
+              <a:ext uri="{FF2B5EF4-FFF2-40B4-BE49-F238E27FC236}">
+                <a16:creationId xmlns:a16="http://schemas.microsoft.com/office/drawing/2014/main" id="{922FB7B4-4726-D7F2-FA15-807FBBA385DE}"/>
+              </a:ext>
+            </a:extLst>
+          </p:cNvPr>
+          <p:cNvSpPr>
+            <a:spLocks noGrp="1"/>
+          </p:cNvSpPr>
+          <p:nvPr>
+            <p:ph type="title"/>
+          </p:nvPr>
+        </p:nvSpPr>
+        <p:spPr>
+          <a:xfrm>
+            <a:off x="6095999" y="1032918"/>
+            <a:ext cx="5452533" cy="4792165"/>
+          </a:xfrm>
+          <a:effectLst/>
+        </p:spPr>
+        <p:txBody>
+          <a:bodyPr vert="horz" lIns="91440" tIns="45720" rIns="91440" bIns="45720" rtlCol="0" anchor="ctr">
+            <a:normAutofit/>
+          </a:bodyPr>
+          <a:lstStyle/>
+          <a:p>
+            <a:r>
+              <a:rPr lang="en-US" sz="6600"/>
+              <a:t>Thank you!</a:t>
+            </a:r>
+            <a:br>
+              <a:rPr lang="en-US" sz="6600"/>
+            </a:br>
+            <a:r>
+              <a:rPr lang="en-US" sz="6600"/>
+              <a:t>Questions?</a:t>
+            </a:r>
+          </a:p>
+        </p:txBody>
+      </p:sp>
+      <p:sp useBgFill="1">
+        <p:nvSpPr>
+          <p:cNvPr id="11" name="Freeform: Shape 10">
+            <a:extLst>
+              <a:ext uri="{FF2B5EF4-FFF2-40B4-BE49-F238E27FC236}">
+                <a16:creationId xmlns:a16="http://schemas.microsoft.com/office/drawing/2014/main" id="{FAC94EAF-F7F7-4727-AE69-A7036B4A5122}"/>
+              </a:ext>
+              <a:ext uri="{C183D7F6-B498-43B3-948B-1728B52AA6E4}">
+                <adec:decorative xmlns:adec="http://schemas.microsoft.com/office/drawing/2017/decorative" val="1"/>
+              </a:ext>
+            </a:extLst>
+          </p:cNvPr>
+          <p:cNvSpPr>
+            <a:spLocks noGrp="1" noRot="1" noChangeAspect="1" noMove="1" noResize="1" noEditPoints="1" noAdjustHandles="1" noChangeArrowheads="1" noChangeShapeType="1" noTextEdit="1"/>
+          </p:cNvSpPr>
+          <p:nvPr>
+            <p:extLst>
+              <p:ext uri="{386F3935-93C4-4BCD-93E2-E3B085C9AB24}">
+                <p16:designElem xmlns:p16="http://schemas.microsoft.com/office/powerpoint/2015/main" val="1"/>
+              </p:ext>
+            </p:extLst>
+          </p:nvPr>
+        </p:nvSpPr>
+        <p:spPr bwMode="auto">
+          <a:xfrm rot="16200000">
+            <a:off x="-650724" y="650724"/>
+            <a:ext cx="6858000" cy="5556552"/>
+          </a:xfrm>
+          <a:custGeom>
+            <a:avLst/>
+            <a:gdLst>
+              <a:gd name="connsiteX0" fmla="*/ 6858000 w 6858000"/>
+              <a:gd name="connsiteY0" fmla="*/ 3445704 h 5556552"/>
+              <a:gd name="connsiteX1" fmla="*/ 3829242 w 6858000"/>
+              <a:gd name="connsiteY1" fmla="*/ 5433322 h 5556552"/>
+              <a:gd name="connsiteX2" fmla="*/ 3827369 w 6858000"/>
+              <a:gd name="connsiteY2" fmla="*/ 5434867 h 5556552"/>
+              <a:gd name="connsiteX3" fmla="*/ 3824583 w 6858000"/>
+              <a:gd name="connsiteY3" fmla="*/ 5436378 h 5556552"/>
+              <a:gd name="connsiteX4" fmla="*/ 3798693 w 6858000"/>
+              <a:gd name="connsiteY4" fmla="*/ 5453370 h 5556552"/>
+              <a:gd name="connsiteX5" fmla="*/ 3785011 w 6858000"/>
+              <a:gd name="connsiteY5" fmla="*/ 5457858 h 5556552"/>
+              <a:gd name="connsiteX6" fmla="*/ 3706339 w 6858000"/>
+              <a:gd name="connsiteY6" fmla="*/ 5500559 h 5556552"/>
+              <a:gd name="connsiteX7" fmla="*/ 3428998 w 6858000"/>
+              <a:gd name="connsiteY7" fmla="*/ 5556552 h 5556552"/>
+              <a:gd name="connsiteX8" fmla="*/ 3151658 w 6858000"/>
+              <a:gd name="connsiteY8" fmla="*/ 5500559 h 5556552"/>
+              <a:gd name="connsiteX9" fmla="*/ 3072996 w 6858000"/>
+              <a:gd name="connsiteY9" fmla="*/ 5457863 h 5556552"/>
+              <a:gd name="connsiteX10" fmla="*/ 3059298 w 6858000"/>
+              <a:gd name="connsiteY10" fmla="*/ 5453370 h 5556552"/>
+              <a:gd name="connsiteX11" fmla="*/ 3033383 w 6858000"/>
+              <a:gd name="connsiteY11" fmla="*/ 5436362 h 5556552"/>
+              <a:gd name="connsiteX12" fmla="*/ 3030627 w 6858000"/>
+              <a:gd name="connsiteY12" fmla="*/ 5434867 h 5556552"/>
+              <a:gd name="connsiteX13" fmla="*/ 3028775 w 6858000"/>
+              <a:gd name="connsiteY13" fmla="*/ 5433338 h 5556552"/>
+              <a:gd name="connsiteX14" fmla="*/ 0 w 6858000"/>
+              <a:gd name="connsiteY14" fmla="*/ 3445704 h 5556552"/>
+              <a:gd name="connsiteX15" fmla="*/ 6858000 w 6858000"/>
+              <a:gd name="connsiteY15" fmla="*/ 0 h 5556552"/>
+              <a:gd name="connsiteX16" fmla="*/ 6858000 w 6858000"/>
+              <a:gd name="connsiteY16" fmla="*/ 349336 h 5556552"/>
+              <a:gd name="connsiteX17" fmla="*/ 6858000 w 6858000"/>
+              <a:gd name="connsiteY17" fmla="*/ 3445703 h 5556552"/>
+              <a:gd name="connsiteX18" fmla="*/ 0 w 6858000"/>
+              <a:gd name="connsiteY18" fmla="*/ 3445703 h 5556552"/>
+              <a:gd name="connsiteX19" fmla="*/ 0 w 6858000"/>
+              <a:gd name="connsiteY19" fmla="*/ 0 h 5556552"/>
+            </a:gdLst>
+            <a:ahLst/>
+            <a:cxnLst>
+              <a:cxn ang="0">
+                <a:pos x="connsiteX0" y="connsiteY0"/>
+              </a:cxn>
+              <a:cxn ang="0">
+                <a:pos x="connsiteX1" y="connsiteY1"/>
+              </a:cxn>
+              <a:cxn ang="0">
+                <a:pos x="connsiteX2" y="connsiteY2"/>
+              </a:cxn>
+              <a:cxn ang="0">
+                <a:pos x="connsiteX3" y="connsiteY3"/>
+              </a:cxn>
+              <a:cxn ang="0">
+                <a:pos x="connsiteX4" y="connsiteY4"/>
+              </a:cxn>
+              <a:cxn ang="0">
+                <a:pos x="connsiteX5" y="connsiteY5"/>
+              </a:cxn>
+              <a:cxn ang="0">
+                <a:pos x="connsiteX6" y="connsiteY6"/>
+              </a:cxn>
+              <a:cxn ang="0">
+                <a:pos x="connsiteX7" y="connsiteY7"/>
+              </a:cxn>
+              <a:cxn ang="0">
+                <a:pos x="connsiteX8" y="connsiteY8"/>
+              </a:cxn>
+              <a:cxn ang="0">
+                <a:pos x="connsiteX9" y="connsiteY9"/>
+              </a:cxn>
+              <a:cxn ang="0">
+                <a:pos x="connsiteX10" y="connsiteY10"/>
+              </a:cxn>
+              <a:cxn ang="0">
+                <a:pos x="connsiteX11" y="connsiteY11"/>
+              </a:cxn>
+              <a:cxn ang="0">
+                <a:pos x="connsiteX12" y="connsiteY12"/>
+              </a:cxn>
+              <a:cxn ang="0">
+                <a:pos x="connsiteX13" y="connsiteY13"/>
+              </a:cxn>
+              <a:cxn ang="0">
+                <a:pos x="connsiteX14" y="connsiteY14"/>
+              </a:cxn>
+              <a:cxn ang="0">
+                <a:pos x="connsiteX15" y="connsiteY15"/>
+              </a:cxn>
+              <a:cxn ang="0">
+                <a:pos x="connsiteX16" y="connsiteY16"/>
+              </a:cxn>
+              <a:cxn ang="0">
+                <a:pos x="connsiteX17" y="connsiteY17"/>
+              </a:cxn>
+              <a:cxn ang="0">
+                <a:pos x="connsiteX18" y="connsiteY18"/>
+              </a:cxn>
+              <a:cxn ang="0">
+                <a:pos x="connsiteX19" y="connsiteY19"/>
+              </a:cxn>
+            </a:cxnLst>
+            <a:rect l="l" t="t" r="r" b="b"/>
+            <a:pathLst>
+              <a:path w="6858000" h="5556552">
+                <a:moveTo>
+                  <a:pt x="6858000" y="3445704"/>
+                </a:moveTo>
+                <a:lnTo>
+                  <a:pt x="3829242" y="5433322"/>
+                </a:lnTo>
+                <a:lnTo>
+                  <a:pt x="3827369" y="5434867"/>
+                </a:lnTo>
+                <a:lnTo>
+                  <a:pt x="3824583" y="5436378"/>
+                </a:lnTo>
+                <a:lnTo>
+                  <a:pt x="3798693" y="5453370"/>
+                </a:lnTo>
+                <a:lnTo>
+                  <a:pt x="3785011" y="5457858"/>
+                </a:lnTo>
+                <a:lnTo>
+                  <a:pt x="3706339" y="5500559"/>
+                </a:lnTo>
+                <a:cubicBezTo>
+                  <a:pt x="3621096" y="5536614"/>
+                  <a:pt x="3527375" y="5556552"/>
+                  <a:pt x="3428998" y="5556552"/>
+                </a:cubicBezTo>
+                <a:cubicBezTo>
+                  <a:pt x="3330621" y="5556552"/>
+                  <a:pt x="3236901" y="5536614"/>
+                  <a:pt x="3151658" y="5500559"/>
+                </a:cubicBezTo>
+                <a:lnTo>
+                  <a:pt x="3072996" y="5457863"/>
+                </a:lnTo>
+                <a:lnTo>
+                  <a:pt x="3059298" y="5453370"/>
+                </a:lnTo>
+                <a:lnTo>
+                  <a:pt x="3033383" y="5436362"/>
+                </a:lnTo>
+                <a:lnTo>
+                  <a:pt x="3030627" y="5434867"/>
+                </a:lnTo>
+                <a:lnTo>
+                  <a:pt x="3028775" y="5433338"/>
+                </a:lnTo>
+                <a:lnTo>
+                  <a:pt x="0" y="3445704"/>
+                </a:lnTo>
+                <a:close/>
+                <a:moveTo>
+                  <a:pt x="6858000" y="0"/>
+                </a:moveTo>
+                <a:lnTo>
+                  <a:pt x="6858000" y="349336"/>
+                </a:lnTo>
+                <a:lnTo>
+                  <a:pt x="6858000" y="3445703"/>
+                </a:lnTo>
+                <a:lnTo>
+                  <a:pt x="0" y="3445703"/>
+                </a:lnTo>
+                <a:lnTo>
+                  <a:pt x="0" y="0"/>
+                </a:lnTo>
+                <a:close/>
+              </a:path>
+            </a:pathLst>
+          </a:custGeom>
+          <a:ln>
+            <a:noFill/>
+          </a:ln>
+          <a:effectLst/>
+          <a:extLst>
+            <a:ext uri="{91240B29-F687-4f45-9708-019B960494DF}">
+              <a14:hiddenLine xmlns="" xmlns:a14="http://schemas.microsoft.com/office/drawing/2010/main" xmlns:p14="http://schemas.microsoft.com/office/powerpoint/2010/main" xmlns:a16="http://schemas.microsoft.com/office/drawing/2014/main" w="9525">
+                <a:solidFill>
+                  <a:srgbClr val="000000"/>
+                </a:solidFill>
+                <a:round/>
+                <a:headEnd/>
+                <a:tailEnd/>
+              </a14:hiddenLine>
+            </a:ext>
+          </a:extLst>
+        </p:spPr>
+        <p:style>
+          <a:lnRef idx="1">
+            <a:schemeClr val="accent1"/>
+          </a:lnRef>
+          <a:fillRef idx="3">
+            <a:schemeClr val="accent1"/>
+          </a:fillRef>
+          <a:effectRef idx="2">
+            <a:schemeClr val="accent1"/>
+          </a:effectRef>
+          <a:fontRef idx="minor">
+            <a:schemeClr val="lt1"/>
+          </a:fontRef>
+        </p:style>
+      </p:sp>
+    </p:spTree>
+    <p:extLst>
+      <p:ext uri="{BB962C8B-B14F-4D97-AF65-F5344CB8AC3E}">
+        <p14:creationId xmlns:p14="http://schemas.microsoft.com/office/powerpoint/2010/main" val="1188815508"/>
+      </p:ext>
+    </p:extLst>
+  </p:cSld>
+  <p:clrMapOvr>
+    <a:masterClrMapping/>
   </p:clrMapOvr>
 </p:sld>
 </file>

</xml_diff>